<commit_message>
Conclusion and analysis slides removed from slide but will be written before presentation day
</commit_message>
<xml_diff>
--- a/Presentations/Project_Final.pptx
+++ b/Presentations/Project_Final.pptx
@@ -18826,7 +18826,7 @@
 </file>
 
 <file path=ppt/slides/slide19.xml><?xml version="1.0" encoding="utf-8"?>
-<p:sld xmlns:a="http://schemas.openxmlformats.org/drawingml/2006/main" xmlns:r="http://schemas.openxmlformats.org/officeDocument/2006/relationships" xmlns:p="http://schemas.openxmlformats.org/presentationml/2006/main">
+<p:sld xmlns:a="http://schemas.openxmlformats.org/drawingml/2006/main" xmlns:r="http://schemas.openxmlformats.org/officeDocument/2006/relationships" xmlns:p="http://schemas.openxmlformats.org/presentationml/2006/main" show="0">
   <p:cSld>
     <p:spTree>
       <p:nvGrpSpPr>
@@ -19117,12 +19117,15 @@
               <a:buFont typeface="Arial" panose="020B0604020202020204" pitchFamily="34" charset="0"/>
               <a:buChar char="•"/>
             </a:pPr>
-            <a:endParaRPr lang="tr-TR" sz="2400" dirty="0">
-              <a:solidFill>
-                <a:schemeClr val="dk1"/>
-              </a:solidFill>
-              <a:latin typeface="+mj-lt"/>
-            </a:endParaRPr>
+            <a:r>
+              <a:rPr lang="tr-TR" sz="2400" dirty="0">
+                <a:solidFill>
+                  <a:schemeClr val="dk1"/>
+                </a:solidFill>
+                <a:latin typeface="+mj-lt"/>
+              </a:rPr>
+              <a:t> </a:t>
+            </a:r>
           </a:p>
           <a:p>
             <a:pPr marL="941832" marR="0" lvl="1" indent="-342900" algn="just" rtl="0">
@@ -19649,7 +19652,7 @@
 </file>
 
 <file path=ppt/slides/slide20.xml><?xml version="1.0" encoding="utf-8"?>
-<p:sld xmlns:a="http://schemas.openxmlformats.org/drawingml/2006/main" xmlns:r="http://schemas.openxmlformats.org/officeDocument/2006/relationships" xmlns:p="http://schemas.openxmlformats.org/presentationml/2006/main">
+<p:sld xmlns:a="http://schemas.openxmlformats.org/drawingml/2006/main" xmlns:r="http://schemas.openxmlformats.org/officeDocument/2006/relationships" xmlns:p="http://schemas.openxmlformats.org/presentationml/2006/main" show="0">
   <p:cSld>
     <p:spTree>
       <p:nvGrpSpPr>

</xml_diff>

<commit_message>
sunum dosyasında hala eksikler var
</commit_message>
<xml_diff>
--- a/Presentations/Project_Final.pptx
+++ b/Presentations/Project_Final.pptx
@@ -332,7 +332,7 @@
       <p15:sldGuideLst xmlns:p15="http://schemas.microsoft.com/office/powerpoint/2012/main"/>
     </p:ext>
     <p:ext uri="GoogleSlidesCustomDataVersion2">
-      <go:slidesCustomData xmlns:go="http://customooxmlschemas.google.com/" xmlns:ahyp="http://schemas.microsoft.com/office/drawing/2018/hyperlinkcolor" xmlns:p15="http://schemas.microsoft.com/office/powerpoint/2012/main" xmlns:p14="http://schemas.microsoft.com/office/powerpoint/2010/main" xmlns:com="http://schemas.openxmlformats.org/drawingml/2006/compatibility" xmlns:pvml="urn:schemas-microsoft-com:office:powerpoint" xmlns:v="urn:schemas-microsoft-com:vml" xmlns:o="urn:schemas-microsoft-com:office:office" xmlns:dgm="http://schemas.openxmlformats.org/drawingml/2006/diagram" xmlns:c="http://schemas.openxmlformats.org/drawingml/2006/chart" xmlns:mv="urn:schemas-microsoft-com:mac:vml" xmlns:mc="http://schemas.openxmlformats.org/markup-compatibility/2006" xmlns="" r:id="rId44" roundtripDataSignature="AMtx7mg5uORYicMT0MeaOpO/20tnanoKVQ=="/>
+      <go:slidesCustomData xmlns="" xmlns:mc="http://schemas.openxmlformats.org/markup-compatibility/2006" xmlns:mv="urn:schemas-microsoft-com:mac:vml" xmlns:c="http://schemas.openxmlformats.org/drawingml/2006/chart" xmlns:dgm="http://schemas.openxmlformats.org/drawingml/2006/diagram" xmlns:o="urn:schemas-microsoft-com:office:office" xmlns:v="urn:schemas-microsoft-com:vml" xmlns:pvml="urn:schemas-microsoft-com:office:powerpoint" xmlns:com="http://schemas.openxmlformats.org/drawingml/2006/compatibility" xmlns:p14="http://schemas.microsoft.com/office/powerpoint/2010/main" xmlns:p15="http://schemas.microsoft.com/office/powerpoint/2012/main" xmlns:ahyp="http://schemas.microsoft.com/office/drawing/2018/hyperlinkcolor" xmlns:go="http://customooxmlschemas.google.com/" r:id="rId44" roundtripDataSignature="AMtx7mg5uORYicMT0MeaOpO/20tnanoKVQ=="/>
     </p:ext>
   </p:extLst>
 </p:presentation>
@@ -2248,6 +2248,343 @@
               </a:spcAft>
               <a:buNone/>
             </a:pPr>
+            <a:r>
+              <a:rPr lang="en-US" noProof="0" dirty="0"/>
+              <a:t>This is the our Project environment at Simulink platform. Each block responsible for different tasks. </a:t>
+            </a:r>
+          </a:p>
+          <a:p>
+            <a:pPr marL="0" lvl="0" indent="0" algn="l" rtl="0">
+              <a:spcBef>
+                <a:spcPts val="0"/>
+              </a:spcBef>
+              <a:spcAft>
+                <a:spcPts val="0"/>
+              </a:spcAft>
+              <a:buNone/>
+            </a:pPr>
+            <a:r>
+              <a:rPr lang="tr-TR" dirty="0" err="1"/>
+              <a:t>Signal</a:t>
+            </a:r>
+            <a:r>
+              <a:rPr lang="tr-TR" dirty="0"/>
+              <a:t> Editor               : </a:t>
+            </a:r>
+            <a:r>
+              <a:rPr lang="tr-TR" b="0" i="0" dirty="0" err="1">
+                <a:solidFill>
+                  <a:schemeClr val="tx1"/>
+                </a:solidFill>
+                <a:latin typeface="+mj-lt"/>
+                <a:cs typeface="Arial"/>
+                <a:sym typeface="Arial"/>
+              </a:rPr>
+              <a:t>It</a:t>
+            </a:r>
+            <a:r>
+              <a:rPr lang="tr-TR" b="0" i="0" dirty="0">
+                <a:solidFill>
+                  <a:schemeClr val="tx1"/>
+                </a:solidFill>
+                <a:latin typeface="+mj-lt"/>
+                <a:cs typeface="Arial"/>
+                <a:sym typeface="Arial"/>
+              </a:rPr>
+              <a:t> g</a:t>
+            </a:r>
+            <a:r>
+              <a:rPr lang="en-US" b="0" i="0" dirty="0" err="1">
+                <a:solidFill>
+                  <a:schemeClr val="tx1"/>
+                </a:solidFill>
+                <a:latin typeface="+mj-lt"/>
+                <a:ea typeface="Arial"/>
+                <a:cs typeface="Arial"/>
+                <a:sym typeface="Arial"/>
+              </a:rPr>
+              <a:t>enerates</a:t>
+            </a:r>
+            <a:r>
+              <a:rPr lang="en-US" b="0" i="0" dirty="0">
+                <a:solidFill>
+                  <a:schemeClr val="tx1"/>
+                </a:solidFill>
+                <a:latin typeface="+mj-lt"/>
+                <a:ea typeface="Arial"/>
+                <a:cs typeface="Arial"/>
+                <a:sym typeface="Arial"/>
+              </a:rPr>
+              <a:t> position and attitude commands</a:t>
+            </a:r>
+            <a:endParaRPr lang="tr-TR" b="0" i="0" dirty="0">
+              <a:solidFill>
+                <a:schemeClr val="tx1"/>
+              </a:solidFill>
+              <a:latin typeface="+mj-lt"/>
+              <a:ea typeface="Arial"/>
+              <a:cs typeface="Arial"/>
+              <a:sym typeface="Arial"/>
+            </a:endParaRPr>
+          </a:p>
+          <a:p>
+            <a:pPr marL="0" lvl="0" indent="0" algn="l" rtl="0">
+              <a:spcBef>
+                <a:spcPts val="0"/>
+              </a:spcBef>
+              <a:spcAft>
+                <a:spcPts val="0"/>
+              </a:spcAft>
+              <a:buNone/>
+            </a:pPr>
+            <a:r>
+              <a:rPr lang="tr-TR" dirty="0" err="1"/>
+              <a:t>Sensors</a:t>
+            </a:r>
+            <a:r>
+              <a:rPr lang="tr-TR" dirty="0"/>
+              <a:t>                       : </a:t>
+            </a:r>
+            <a:r>
+              <a:rPr lang="tr-TR" dirty="0" err="1"/>
+              <a:t>It</a:t>
+            </a:r>
+            <a:r>
+              <a:rPr lang="tr-TR" dirty="0"/>
+              <a:t> </a:t>
+            </a:r>
+            <a:r>
+              <a:rPr lang="en-US" b="0" i="0" dirty="0">
+                <a:solidFill>
+                  <a:schemeClr val="tx1"/>
+                </a:solidFill>
+                <a:latin typeface="+mj-lt"/>
+                <a:ea typeface="Arial"/>
+                <a:cs typeface="Arial"/>
+                <a:sym typeface="Arial"/>
+              </a:rPr>
+              <a:t>includes the model of sensors such as IMU on the quadcopter</a:t>
+            </a:r>
+            <a:endParaRPr lang="tr-TR" dirty="0"/>
+          </a:p>
+          <a:p>
+            <a:pPr marL="0" lvl="0" indent="0" algn="l" rtl="0">
+              <a:spcBef>
+                <a:spcPts val="0"/>
+              </a:spcBef>
+              <a:spcAft>
+                <a:spcPts val="0"/>
+              </a:spcAft>
+              <a:buNone/>
+            </a:pPr>
+            <a:r>
+              <a:rPr lang="tr-TR" dirty="0"/>
+              <a:t>Flight Control </a:t>
+            </a:r>
+            <a:r>
+              <a:rPr lang="tr-TR" dirty="0" err="1"/>
+              <a:t>System</a:t>
+            </a:r>
+            <a:r>
+              <a:rPr lang="tr-TR" dirty="0"/>
+              <a:t> : </a:t>
+            </a:r>
+            <a:r>
+              <a:rPr lang="tr-TR" dirty="0" err="1"/>
+              <a:t>It</a:t>
+            </a:r>
+            <a:r>
+              <a:rPr lang="tr-TR" dirty="0"/>
+              <a:t> </a:t>
+            </a:r>
+            <a:r>
+              <a:rPr lang="en-US" b="0" i="0" dirty="0">
+                <a:solidFill>
+                  <a:schemeClr val="tx1"/>
+                </a:solidFill>
+                <a:latin typeface="+mj-lt"/>
+                <a:ea typeface="Arial"/>
+                <a:cs typeface="Arial"/>
+                <a:sym typeface="Arial"/>
+              </a:rPr>
+              <a:t>is responsible for position and attitude control. Here, we will perform attitude control using RL (Reinforcement Learning)</a:t>
+            </a:r>
+            <a:endParaRPr lang="tr-TR" b="0" i="0" dirty="0">
+              <a:solidFill>
+                <a:schemeClr val="tx1"/>
+              </a:solidFill>
+              <a:latin typeface="+mj-lt"/>
+              <a:ea typeface="Arial"/>
+              <a:cs typeface="Arial"/>
+              <a:sym typeface="Arial"/>
+            </a:endParaRPr>
+          </a:p>
+          <a:p>
+            <a:pPr marL="0" lvl="0" indent="0" algn="l" rtl="0">
+              <a:spcBef>
+                <a:spcPts val="0"/>
+              </a:spcBef>
+              <a:spcAft>
+                <a:spcPts val="0"/>
+              </a:spcAft>
+              <a:buNone/>
+            </a:pPr>
+            <a:r>
+              <a:rPr lang="tr-TR" dirty="0"/>
+              <a:t>Environment               : </a:t>
+            </a:r>
+            <a:r>
+              <a:rPr lang="tr-TR" dirty="0" err="1"/>
+              <a:t>It</a:t>
+            </a:r>
+            <a:r>
+              <a:rPr lang="tr-TR" dirty="0"/>
+              <a:t> </a:t>
+            </a:r>
+            <a:r>
+              <a:rPr lang="en-US" b="0" i="0" dirty="0">
+                <a:solidFill>
+                  <a:schemeClr val="tx1"/>
+                </a:solidFill>
+                <a:latin typeface="+mj-lt"/>
+                <a:ea typeface="Arial"/>
+                <a:cs typeface="Arial"/>
+                <a:sym typeface="Arial"/>
+              </a:rPr>
+              <a:t>includes gravity, air temperature, speed of sound, pressure, air density, and magnetic field</a:t>
+            </a:r>
+            <a:endParaRPr lang="tr-TR" dirty="0"/>
+          </a:p>
+          <a:p>
+            <a:pPr marL="0" lvl="0" indent="0" algn="l" rtl="0">
+              <a:spcBef>
+                <a:spcPts val="0"/>
+              </a:spcBef>
+              <a:spcAft>
+                <a:spcPts val="0"/>
+              </a:spcAft>
+              <a:buNone/>
+            </a:pPr>
+            <a:r>
+              <a:rPr lang="en-US" noProof="0" dirty="0"/>
+              <a:t>Airframe</a:t>
+            </a:r>
+            <a:r>
+              <a:rPr lang="tr-TR" dirty="0"/>
+              <a:t>                     : </a:t>
+            </a:r>
+            <a:r>
+              <a:rPr lang="tr-TR" dirty="0" err="1"/>
+              <a:t>It</a:t>
+            </a:r>
+            <a:r>
+              <a:rPr lang="tr-TR" dirty="0"/>
+              <a:t> </a:t>
+            </a:r>
+            <a:r>
+              <a:rPr lang="en-US" b="0" i="0" dirty="0">
+                <a:solidFill>
+                  <a:schemeClr val="tx1"/>
+                </a:solidFill>
+                <a:latin typeface="+mj-lt"/>
+                <a:ea typeface="Arial"/>
+                <a:cs typeface="Arial"/>
+                <a:sym typeface="Arial"/>
+              </a:rPr>
+              <a:t>contains the nonlinear model of the quadcopter</a:t>
+            </a:r>
+            <a:endParaRPr lang="tr-TR" b="0" i="0" dirty="0">
+              <a:solidFill>
+                <a:schemeClr val="tx1"/>
+              </a:solidFill>
+              <a:latin typeface="+mj-lt"/>
+              <a:ea typeface="Arial"/>
+              <a:cs typeface="Arial"/>
+              <a:sym typeface="Arial"/>
+            </a:endParaRPr>
+          </a:p>
+          <a:p>
+            <a:pPr marL="0" lvl="0" indent="0" algn="l" rtl="0">
+              <a:spcBef>
+                <a:spcPts val="0"/>
+              </a:spcBef>
+              <a:spcAft>
+                <a:spcPts val="0"/>
+              </a:spcAft>
+              <a:buNone/>
+            </a:pPr>
+            <a:r>
+              <a:rPr lang="en-US" b="0" i="0" dirty="0">
+                <a:solidFill>
+                  <a:schemeClr val="tx1"/>
+                </a:solidFill>
+                <a:latin typeface="+mj-lt"/>
+                <a:ea typeface="Arial"/>
+                <a:cs typeface="Arial"/>
+                <a:sym typeface="Arial"/>
+              </a:rPr>
+              <a:t>Visualization</a:t>
+            </a:r>
+            <a:r>
+              <a:rPr lang="tr-TR" b="0" i="0" dirty="0">
+                <a:solidFill>
+                  <a:schemeClr val="tx1"/>
+                </a:solidFill>
+                <a:latin typeface="+mj-lt"/>
+                <a:ea typeface="Arial"/>
+                <a:cs typeface="Arial"/>
+                <a:sym typeface="Arial"/>
+              </a:rPr>
+              <a:t>:              : </a:t>
+            </a:r>
+            <a:r>
+              <a:rPr lang="tr-TR" b="0" i="0" dirty="0" err="1">
+                <a:solidFill>
+                  <a:schemeClr val="tx1"/>
+                </a:solidFill>
+                <a:latin typeface="+mj-lt"/>
+                <a:ea typeface="Arial"/>
+                <a:cs typeface="Arial"/>
+                <a:sym typeface="Arial"/>
+              </a:rPr>
+              <a:t>It</a:t>
+            </a:r>
+            <a:r>
+              <a:rPr lang="tr-TR" b="0" i="0" dirty="0">
+                <a:solidFill>
+                  <a:schemeClr val="tx1"/>
+                </a:solidFill>
+                <a:latin typeface="+mj-lt"/>
+                <a:ea typeface="Arial"/>
+                <a:cs typeface="Arial"/>
+                <a:sym typeface="Arial"/>
+              </a:rPr>
+              <a:t> </a:t>
+            </a:r>
+            <a:r>
+              <a:rPr lang="en-US" b="0" i="0" dirty="0">
+                <a:solidFill>
+                  <a:schemeClr val="tx1"/>
+                </a:solidFill>
+                <a:latin typeface="+mj-lt"/>
+                <a:ea typeface="Arial"/>
+                <a:cs typeface="Arial"/>
+                <a:sym typeface="Arial"/>
+              </a:rPr>
+              <a:t>facilitates logging and scoping of commands, control signals, and states, it contains also workspace and Simulink 3D animation. </a:t>
+            </a:r>
+            <a:endParaRPr lang="tr-TR" dirty="0"/>
+          </a:p>
+          <a:p>
+            <a:pPr marL="0" lvl="0" indent="0" algn="l" rtl="0">
+              <a:spcBef>
+                <a:spcPts val="0"/>
+              </a:spcBef>
+              <a:spcAft>
+                <a:spcPts val="0"/>
+              </a:spcAft>
+              <a:buNone/>
+            </a:pPr>
             <a:endParaRPr lang="en-US" noProof="0" dirty="0"/>
           </a:p>
         </p:txBody>
@@ -2417,6 +2754,67 @@
               </a:spcAft>
               <a:buNone/>
             </a:pPr>
+            <a:r>
+              <a:rPr lang="en-US" noProof="0" dirty="0"/>
+              <a:t>This is the flight control system block that we focused one. </a:t>
+            </a:r>
+          </a:p>
+          <a:p>
+            <a:pPr marL="0" lvl="0" indent="0" algn="l" rtl="0">
+              <a:spcBef>
+                <a:spcPts val="0"/>
+              </a:spcBef>
+              <a:spcAft>
+                <a:spcPts val="0"/>
+              </a:spcAft>
+              <a:buNone/>
+            </a:pPr>
+            <a:r>
+              <a:rPr lang="en-US" noProof="0" dirty="0"/>
+              <a:t>The orange blocks are normally controlled with PID controller. However, we added inside these blocks RL agents. </a:t>
+            </a:r>
+          </a:p>
+          <a:p>
+            <a:pPr marL="0" lvl="0" indent="0" algn="l" rtl="0">
+              <a:spcBef>
+                <a:spcPts val="0"/>
+              </a:spcBef>
+              <a:spcAft>
+                <a:spcPts val="0"/>
+              </a:spcAft>
+              <a:buNone/>
+            </a:pPr>
+            <a:r>
+              <a:rPr lang="en-US" noProof="0" dirty="0"/>
+              <a:t>Our plan was firstly run the environment with PID controlling blocks. And this worked fine</a:t>
+            </a:r>
+          </a:p>
+          <a:p>
+            <a:pPr marL="0" lvl="0" indent="0" algn="l" rtl="0">
+              <a:spcBef>
+                <a:spcPts val="0"/>
+              </a:spcBef>
+              <a:spcAft>
+                <a:spcPts val="0"/>
+              </a:spcAft>
+              <a:buNone/>
+            </a:pPr>
+            <a:r>
+              <a:rPr lang="en-US" noProof="0" dirty="0"/>
+              <a:t>After then changed one of the blocks with RL agent and trained.  We did not change both of these blocks simultaneously. If it is done simultaneously agent training itself wrongly due to the two unknown dynamic struct</a:t>
+            </a:r>
+            <a:endParaRPr lang="tr-TR" noProof="0" dirty="0"/>
+          </a:p>
+          <a:p>
+            <a:pPr marL="0" lvl="0" indent="0" algn="l" rtl="0">
+              <a:spcBef>
+                <a:spcPts val="0"/>
+              </a:spcBef>
+              <a:spcAft>
+                <a:spcPts val="0"/>
+              </a:spcAft>
+              <a:buNone/>
+            </a:pPr>
             <a:endParaRPr lang="en-US" noProof="0" dirty="0"/>
           </a:p>
         </p:txBody>
@@ -2587,37 +2985,6 @@
               <a:buNone/>
             </a:pPr>
             <a:r>
-              <a:rPr lang="tr-TR" noProof="0" dirty="0" err="1"/>
-              <a:t>Reward</a:t>
-            </a:r>
-            <a:r>
-              <a:rPr lang="tr-TR" noProof="0" dirty="0"/>
-              <a:t> fonksiyonların formülleri düzenlenecek.</a:t>
-            </a:r>
-          </a:p>
-          <a:p>
-            <a:pPr marL="0" lvl="0" indent="0" algn="l" rtl="0">
-              <a:spcBef>
-                <a:spcPts val="0"/>
-              </a:spcBef>
-              <a:spcAft>
-                <a:spcPts val="0"/>
-              </a:spcAft>
-              <a:buNone/>
-            </a:pPr>
-            <a:endParaRPr lang="tr-TR" noProof="0" dirty="0"/>
-          </a:p>
-          <a:p>
-            <a:pPr marL="0" lvl="0" indent="0" algn="l" rtl="0">
-              <a:spcBef>
-                <a:spcPts val="0"/>
-              </a:spcBef>
-              <a:spcAft>
-                <a:spcPts val="0"/>
-              </a:spcAft>
-              <a:buNone/>
-            </a:pPr>
-            <a:r>
               <a:rPr lang="en-US" noProof="0" dirty="0"/>
               <a:t>This is the agent and its environment block</a:t>
             </a:r>
@@ -4030,13 +4397,94 @@
               <a:defRPr/>
             </a:pPr>
             <a:r>
+              <a:rPr lang="tr-TR" sz="1200" dirty="0" err="1">
+                <a:latin typeface="+mj-lt"/>
+                <a:ea typeface="Calibri"/>
+                <a:cs typeface="Calibri"/>
+                <a:sym typeface="Calibri"/>
+              </a:rPr>
+              <a:t>We</a:t>
+            </a:r>
+            <a:r>
               <a:rPr lang="tr-TR" sz="1200" dirty="0">
                 <a:latin typeface="+mj-lt"/>
                 <a:ea typeface="Calibri"/>
                 <a:cs typeface="Calibri"/>
                 <a:sym typeface="Calibri"/>
               </a:rPr>
-              <a:t>Flight </a:t>
+              <a:t> </a:t>
+            </a:r>
+            <a:r>
+              <a:rPr lang="tr-TR" sz="1200" dirty="0" err="1">
+                <a:latin typeface="+mj-lt"/>
+                <a:ea typeface="Calibri"/>
+                <a:cs typeface="Calibri"/>
+                <a:sym typeface="Calibri"/>
+              </a:rPr>
+              <a:t>worked</a:t>
+            </a:r>
+            <a:r>
+              <a:rPr lang="tr-TR" sz="1200" dirty="0">
+                <a:latin typeface="+mj-lt"/>
+                <a:ea typeface="Calibri"/>
+                <a:cs typeface="Calibri"/>
+                <a:sym typeface="Calibri"/>
+              </a:rPr>
+              <a:t> </a:t>
+            </a:r>
+            <a:r>
+              <a:rPr lang="tr-TR" sz="1200" dirty="0" err="1">
+                <a:latin typeface="+mj-lt"/>
+                <a:ea typeface="Calibri"/>
+                <a:cs typeface="Calibri"/>
+                <a:sym typeface="Calibri"/>
+              </a:rPr>
+              <a:t>with</a:t>
+            </a:r>
+            <a:r>
+              <a:rPr lang="tr-TR" sz="1200" dirty="0">
+                <a:latin typeface="+mj-lt"/>
+                <a:ea typeface="Calibri"/>
+                <a:cs typeface="Calibri"/>
+                <a:sym typeface="Calibri"/>
+              </a:rPr>
+              <a:t> </a:t>
+            </a:r>
+            <a:r>
+              <a:rPr lang="tr-TR" sz="1200" dirty="0" err="1">
+                <a:latin typeface="+mj-lt"/>
+                <a:ea typeface="Calibri"/>
+                <a:cs typeface="Calibri"/>
+                <a:sym typeface="Calibri"/>
+              </a:rPr>
+              <a:t>the</a:t>
+            </a:r>
+            <a:r>
+              <a:rPr lang="tr-TR" sz="1200" dirty="0">
+                <a:latin typeface="+mj-lt"/>
+                <a:ea typeface="Calibri"/>
+                <a:cs typeface="Calibri"/>
+                <a:sym typeface="Calibri"/>
+              </a:rPr>
+              <a:t> </a:t>
+            </a:r>
+            <a:r>
+              <a:rPr lang="tr-TR" sz="1200" dirty="0" err="1">
+                <a:latin typeface="+mj-lt"/>
+                <a:ea typeface="Calibri"/>
+                <a:cs typeface="Calibri"/>
+                <a:sym typeface="Calibri"/>
+              </a:rPr>
+              <a:t>drone</a:t>
+            </a:r>
+            <a:r>
+              <a:rPr lang="tr-TR" sz="1200" dirty="0">
+                <a:latin typeface="+mj-lt"/>
+                <a:ea typeface="Calibri"/>
+                <a:cs typeface="Calibri"/>
+                <a:sym typeface="Calibri"/>
+              </a:rPr>
+              <a:t> </a:t>
             </a:r>
             <a:r>
               <a:rPr lang="tr-TR" sz="1200" dirty="0" err="1">
@@ -4072,7 +4520,7 @@
                 <a:cs typeface="Calibri"/>
                 <a:sym typeface="Calibri"/>
               </a:rPr>
-              <a:t> </a:t>
+              <a:t>. </a:t>
             </a:r>
             <a:r>
               <a:rPr lang="tr-TR" sz="1200" dirty="0" err="1">
@@ -4081,7 +4529,7 @@
                 <a:cs typeface="Calibri"/>
                 <a:sym typeface="Calibri"/>
               </a:rPr>
-              <a:t>are</a:t>
+              <a:t>These</a:t>
             </a:r>
             <a:r>
               <a:rPr lang="tr-TR" sz="1200" dirty="0">
@@ -4092,6 +4540,222 @@
               </a:rPr>
               <a:t> </a:t>
             </a:r>
+            <a:r>
+              <a:rPr lang="tr-TR" sz="1200" dirty="0" err="1">
+                <a:latin typeface="+mj-lt"/>
+                <a:ea typeface="Calibri"/>
+                <a:cs typeface="Calibri"/>
+                <a:sym typeface="Calibri"/>
+              </a:rPr>
+              <a:t>systems</a:t>
+            </a:r>
+            <a:r>
+              <a:rPr lang="tr-TR" sz="1200" dirty="0">
+                <a:latin typeface="+mj-lt"/>
+                <a:ea typeface="Calibri"/>
+                <a:cs typeface="Calibri"/>
+                <a:sym typeface="Calibri"/>
+              </a:rPr>
+              <a:t> </a:t>
+            </a:r>
+            <a:r>
+              <a:rPr lang="tr-TR" sz="1200" dirty="0" err="1">
+                <a:latin typeface="+mj-lt"/>
+                <a:ea typeface="Calibri"/>
+                <a:cs typeface="Calibri"/>
+                <a:sym typeface="Calibri"/>
+              </a:rPr>
+              <a:t>composed</a:t>
+            </a:r>
+            <a:r>
+              <a:rPr lang="tr-TR" sz="1200" dirty="0">
+                <a:latin typeface="+mj-lt"/>
+                <a:ea typeface="Calibri"/>
+                <a:cs typeface="Calibri"/>
+                <a:sym typeface="Calibri"/>
+              </a:rPr>
+              <a:t> of </a:t>
+            </a:r>
+            <a:r>
+              <a:rPr lang="tr-TR" sz="1200" dirty="0" err="1">
+                <a:latin typeface="+mj-lt"/>
+                <a:ea typeface="Calibri"/>
+                <a:cs typeface="Calibri"/>
+                <a:sym typeface="Calibri"/>
+              </a:rPr>
+              <a:t>different</a:t>
+            </a:r>
+            <a:r>
+              <a:rPr lang="tr-TR" sz="1200" dirty="0">
+                <a:latin typeface="+mj-lt"/>
+                <a:ea typeface="Calibri"/>
+                <a:cs typeface="Calibri"/>
+                <a:sym typeface="Calibri"/>
+              </a:rPr>
+              <a:t> </a:t>
+            </a:r>
+            <a:r>
+              <a:rPr lang="tr-TR" sz="1200" dirty="0" err="1">
+                <a:latin typeface="+mj-lt"/>
+                <a:ea typeface="Calibri"/>
+                <a:cs typeface="Calibri"/>
+                <a:sym typeface="Calibri"/>
+              </a:rPr>
+              <a:t>control</a:t>
+            </a:r>
+            <a:r>
+              <a:rPr lang="tr-TR" sz="1200" dirty="0">
+                <a:latin typeface="+mj-lt"/>
+                <a:ea typeface="Calibri"/>
+                <a:cs typeface="Calibri"/>
+                <a:sym typeface="Calibri"/>
+              </a:rPr>
+              <a:t> </a:t>
+            </a:r>
+            <a:r>
+              <a:rPr lang="tr-TR" sz="1200" dirty="0" err="1">
+                <a:latin typeface="+mj-lt"/>
+                <a:ea typeface="Calibri"/>
+                <a:cs typeface="Calibri"/>
+                <a:sym typeface="Calibri"/>
+              </a:rPr>
+              <a:t>algorithms</a:t>
+            </a:r>
+            <a:r>
+              <a:rPr lang="tr-TR" sz="1200" dirty="0">
+                <a:latin typeface="+mj-lt"/>
+                <a:ea typeface="Calibri"/>
+                <a:cs typeface="Calibri"/>
+                <a:sym typeface="Calibri"/>
+              </a:rPr>
+              <a:t>. </a:t>
+            </a:r>
+            <a:r>
+              <a:rPr lang="tr-TR" sz="1200" dirty="0" err="1">
+                <a:latin typeface="+mj-lt"/>
+                <a:ea typeface="Calibri"/>
+                <a:cs typeface="Calibri"/>
+                <a:sym typeface="Calibri"/>
+              </a:rPr>
+              <a:t>We</a:t>
+            </a:r>
+            <a:r>
+              <a:rPr lang="tr-TR" sz="1200" dirty="0">
+                <a:latin typeface="+mj-lt"/>
+                <a:ea typeface="Calibri"/>
+                <a:cs typeface="Calibri"/>
+                <a:sym typeface="Calibri"/>
+              </a:rPr>
+              <a:t> </a:t>
+            </a:r>
+            <a:r>
+              <a:rPr lang="tr-TR" sz="1200" dirty="0" err="1">
+                <a:latin typeface="+mj-lt"/>
+                <a:ea typeface="Calibri"/>
+                <a:cs typeface="Calibri"/>
+                <a:sym typeface="Calibri"/>
+              </a:rPr>
+              <a:t>aimed</a:t>
+            </a:r>
+            <a:r>
+              <a:rPr lang="tr-TR" sz="1200" dirty="0">
+                <a:latin typeface="+mj-lt"/>
+                <a:ea typeface="Calibri"/>
+                <a:cs typeface="Calibri"/>
+                <a:sym typeface="Calibri"/>
+              </a:rPr>
+              <a:t> </a:t>
+            </a:r>
+            <a:r>
+              <a:rPr lang="tr-TR" sz="1200" dirty="0" err="1">
+                <a:latin typeface="+mj-lt"/>
+                <a:ea typeface="Calibri"/>
+                <a:cs typeface="Calibri"/>
+                <a:sym typeface="Calibri"/>
+              </a:rPr>
+              <a:t>to</a:t>
+            </a:r>
+            <a:r>
+              <a:rPr lang="tr-TR" sz="1200" dirty="0">
+                <a:latin typeface="+mj-lt"/>
+                <a:ea typeface="Calibri"/>
+                <a:cs typeface="Calibri"/>
+                <a:sym typeface="Calibri"/>
+              </a:rPr>
+              <a:t> </a:t>
+            </a:r>
+            <a:r>
+              <a:rPr lang="tr-TR" sz="1200" dirty="0" err="1">
+                <a:latin typeface="+mj-lt"/>
+                <a:ea typeface="Calibri"/>
+                <a:cs typeface="Calibri"/>
+                <a:sym typeface="Calibri"/>
+              </a:rPr>
+              <a:t>control</a:t>
+            </a:r>
+            <a:r>
+              <a:rPr lang="tr-TR" sz="1200" dirty="0">
+                <a:latin typeface="+mj-lt"/>
+                <a:ea typeface="Calibri"/>
+                <a:cs typeface="Calibri"/>
+                <a:sym typeface="Calibri"/>
+              </a:rPr>
+              <a:t> </a:t>
+            </a:r>
+            <a:r>
+              <a:rPr lang="tr-TR" sz="1200" dirty="0" err="1">
+                <a:latin typeface="+mj-lt"/>
+                <a:ea typeface="Calibri"/>
+                <a:cs typeface="Calibri"/>
+                <a:sym typeface="Calibri"/>
+              </a:rPr>
+              <a:t>the</a:t>
+            </a:r>
+            <a:r>
+              <a:rPr lang="tr-TR" sz="1200" dirty="0">
+                <a:latin typeface="+mj-lt"/>
+                <a:ea typeface="Calibri"/>
+                <a:cs typeface="Calibri"/>
+                <a:sym typeface="Calibri"/>
+              </a:rPr>
+              <a:t> </a:t>
+            </a:r>
+            <a:r>
+              <a:rPr lang="tr-TR" sz="1200" dirty="0" err="1">
+                <a:latin typeface="+mj-lt"/>
+                <a:ea typeface="Calibri"/>
+                <a:cs typeface="Calibri"/>
+                <a:sym typeface="Calibri"/>
+              </a:rPr>
+              <a:t>attitude</a:t>
+            </a:r>
+            <a:r>
+              <a:rPr lang="tr-TR" sz="1200" dirty="0">
+                <a:latin typeface="+mj-lt"/>
+                <a:ea typeface="Calibri"/>
+                <a:cs typeface="Calibri"/>
+                <a:sym typeface="Calibri"/>
+              </a:rPr>
+              <a:t> </a:t>
+            </a:r>
+            <a:r>
+              <a:rPr lang="tr-TR" sz="1200" dirty="0" err="1">
+                <a:latin typeface="+mj-lt"/>
+                <a:ea typeface="Calibri"/>
+                <a:cs typeface="Calibri"/>
+                <a:sym typeface="Calibri"/>
+              </a:rPr>
+              <a:t>controller</a:t>
+            </a:r>
+            <a:r>
+              <a:rPr lang="tr-TR" sz="1200" dirty="0">
+                <a:latin typeface="+mj-lt"/>
+                <a:ea typeface="Calibri"/>
+                <a:cs typeface="Calibri"/>
+                <a:sym typeface="Calibri"/>
+              </a:rPr>
+              <a:t>.</a:t>
+            </a:r>
           </a:p>
           <a:p>
             <a:pPr marL="0" marR="0" lvl="0" indent="0" algn="l" defTabSz="914400" rtl="0" eaLnBrk="1" fontAlgn="auto" latinLnBrk="0" hangingPunct="1">
@@ -4113,81 +4777,222 @@
               <a:tabLst/>
               <a:defRPr/>
             </a:pPr>
-            <a:endParaRPr lang="tr-TR" sz="1200" dirty="0">
-              <a:latin typeface="+mj-lt"/>
-              <a:ea typeface="Calibri"/>
-              <a:cs typeface="Calibri"/>
-              <a:sym typeface="Calibri"/>
-            </a:endParaRPr>
-          </a:p>
-          <a:p>
-            <a:pPr marL="0" marR="0" lvl="0" indent="0" algn="l" defTabSz="914400" rtl="0" eaLnBrk="1" fontAlgn="auto" latinLnBrk="0" hangingPunct="1">
-              <a:lnSpc>
-                <a:spcPct val="100000"/>
-              </a:lnSpc>
-              <a:spcBef>
-                <a:spcPts val="0"/>
-              </a:spcBef>
-              <a:spcAft>
-                <a:spcPts val="0"/>
-              </a:spcAft>
-              <a:buClr>
-                <a:srgbClr val="000000"/>
-              </a:buClr>
-              <a:buSzPts val="1400"/>
-              <a:buFont typeface="Arial"/>
-              <a:buNone/>
-              <a:tabLst/>
-              <a:defRPr/>
-            </a:pPr>
-            <a:endParaRPr lang="tr-TR" sz="1200" dirty="0">
-              <a:latin typeface="+mj-lt"/>
-              <a:ea typeface="Calibri"/>
-              <a:cs typeface="Calibri"/>
-              <a:sym typeface="Calibri"/>
-            </a:endParaRPr>
-          </a:p>
-          <a:p>
-            <a:pPr marL="0" marR="0" lvl="0" indent="0" algn="l" defTabSz="914400" rtl="0" eaLnBrk="1" fontAlgn="auto" latinLnBrk="0" hangingPunct="1">
-              <a:lnSpc>
-                <a:spcPct val="100000"/>
-              </a:lnSpc>
-              <a:spcBef>
-                <a:spcPts val="0"/>
-              </a:spcBef>
-              <a:spcAft>
-                <a:spcPts val="0"/>
-              </a:spcAft>
-              <a:buClr>
-                <a:srgbClr val="000000"/>
-              </a:buClr>
-              <a:buSzPts val="1400"/>
-              <a:buFont typeface="Arial"/>
-              <a:buNone/>
-              <a:tabLst/>
-              <a:defRPr/>
-            </a:pPr>
-            <a:r>
-              <a:rPr lang="en-US" sz="1200" dirty="0">
+            <a:r>
+              <a:rPr lang="tr-TR" sz="1200" dirty="0" err="1">
                 <a:latin typeface="+mj-lt"/>
                 <a:ea typeface="Calibri"/>
                 <a:cs typeface="Calibri"/>
                 <a:sym typeface="Calibri"/>
               </a:rPr>
-              <a:t>In this project we focused on attitude control which controls the orientation with roll, pitch, yaw angles.</a:t>
-            </a:r>
-          </a:p>
-          <a:p>
-            <a:pPr marL="0" lvl="0" indent="0" algn="l" rtl="0">
-              <a:spcBef>
-                <a:spcPts val="0"/>
-              </a:spcBef>
-              <a:spcAft>
-                <a:spcPts val="0"/>
-              </a:spcAft>
-              <a:buNone/>
-            </a:pPr>
-            <a:endParaRPr dirty="0"/>
+              <a:t>This</a:t>
+            </a:r>
+            <a:r>
+              <a:rPr lang="tr-TR" sz="1200" dirty="0">
+                <a:latin typeface="+mj-lt"/>
+                <a:ea typeface="Calibri"/>
+                <a:cs typeface="Calibri"/>
+                <a:sym typeface="Calibri"/>
+              </a:rPr>
+              <a:t> </a:t>
+            </a:r>
+            <a:r>
+              <a:rPr lang="tr-TR" sz="1200" dirty="0" err="1">
+                <a:latin typeface="+mj-lt"/>
+                <a:ea typeface="Calibri"/>
+                <a:cs typeface="Calibri"/>
+                <a:sym typeface="Calibri"/>
+              </a:rPr>
+              <a:t>controller</a:t>
+            </a:r>
+            <a:r>
+              <a:rPr lang="tr-TR" sz="1200" dirty="0">
+                <a:latin typeface="+mj-lt"/>
+                <a:ea typeface="Calibri"/>
+                <a:cs typeface="Calibri"/>
+                <a:sym typeface="Calibri"/>
+              </a:rPr>
+              <a:t> is </a:t>
+            </a:r>
+            <a:r>
+              <a:rPr lang="tr-TR" sz="1200" dirty="0" err="1">
+                <a:latin typeface="+mj-lt"/>
+                <a:ea typeface="Calibri"/>
+                <a:cs typeface="Calibri"/>
+                <a:sym typeface="Calibri"/>
+              </a:rPr>
+              <a:t>made</a:t>
+            </a:r>
+            <a:r>
+              <a:rPr lang="tr-TR" sz="1200" dirty="0">
+                <a:latin typeface="+mj-lt"/>
+                <a:ea typeface="Calibri"/>
+                <a:cs typeface="Calibri"/>
+                <a:sym typeface="Calibri"/>
+              </a:rPr>
+              <a:t> </a:t>
+            </a:r>
+            <a:r>
+              <a:rPr lang="tr-TR" sz="1200" dirty="0" err="1">
+                <a:latin typeface="+mj-lt"/>
+                <a:ea typeface="Calibri"/>
+                <a:cs typeface="Calibri"/>
+                <a:sym typeface="Calibri"/>
+              </a:rPr>
+              <a:t>by</a:t>
+            </a:r>
+            <a:r>
+              <a:rPr lang="tr-TR" sz="1200" dirty="0">
+                <a:latin typeface="+mj-lt"/>
+                <a:ea typeface="Calibri"/>
+                <a:cs typeface="Calibri"/>
+                <a:sym typeface="Calibri"/>
+              </a:rPr>
+              <a:t> </a:t>
+            </a:r>
+            <a:r>
+              <a:rPr lang="tr-TR" sz="1200" dirty="0" err="1">
+                <a:latin typeface="+mj-lt"/>
+                <a:ea typeface="Calibri"/>
+                <a:cs typeface="Calibri"/>
+                <a:sym typeface="Calibri"/>
+              </a:rPr>
+              <a:t>using</a:t>
+            </a:r>
+            <a:r>
+              <a:rPr lang="tr-TR" sz="1200" dirty="0">
+                <a:latin typeface="+mj-lt"/>
+                <a:ea typeface="Calibri"/>
+                <a:cs typeface="Calibri"/>
+                <a:sym typeface="Calibri"/>
+              </a:rPr>
+              <a:t> </a:t>
+            </a:r>
+            <a:r>
+              <a:rPr lang="tr-TR" sz="1200" dirty="0" err="1">
+                <a:latin typeface="+mj-lt"/>
+                <a:ea typeface="Calibri"/>
+                <a:cs typeface="Calibri"/>
+                <a:sym typeface="Calibri"/>
+              </a:rPr>
+              <a:t>the</a:t>
+            </a:r>
+            <a:r>
+              <a:rPr lang="tr-TR" sz="1200" dirty="0">
+                <a:latin typeface="+mj-lt"/>
+                <a:ea typeface="Calibri"/>
+                <a:cs typeface="Calibri"/>
+                <a:sym typeface="Calibri"/>
+              </a:rPr>
+              <a:t> PID </a:t>
+            </a:r>
+            <a:r>
+              <a:rPr lang="tr-TR" sz="1200" dirty="0" err="1">
+                <a:latin typeface="+mj-lt"/>
+                <a:ea typeface="Calibri"/>
+                <a:cs typeface="Calibri"/>
+                <a:sym typeface="Calibri"/>
+              </a:rPr>
+              <a:t>controller</a:t>
+            </a:r>
+            <a:r>
+              <a:rPr lang="tr-TR" sz="1200" dirty="0">
+                <a:latin typeface="+mj-lt"/>
+                <a:ea typeface="Calibri"/>
+                <a:cs typeface="Calibri"/>
+                <a:sym typeface="Calibri"/>
+              </a:rPr>
+              <a:t> . </a:t>
+            </a:r>
+            <a:r>
+              <a:rPr lang="tr-TR" sz="1200" dirty="0" err="1">
+                <a:latin typeface="+mj-lt"/>
+                <a:ea typeface="Calibri"/>
+                <a:cs typeface="Calibri"/>
+                <a:sym typeface="Calibri"/>
+              </a:rPr>
+              <a:t>However</a:t>
+            </a:r>
+            <a:r>
+              <a:rPr lang="tr-TR" sz="1200" dirty="0">
+                <a:latin typeface="+mj-lt"/>
+                <a:ea typeface="Calibri"/>
+                <a:cs typeface="Calibri"/>
+                <a:sym typeface="Calibri"/>
+              </a:rPr>
+              <a:t>, PID </a:t>
+            </a:r>
+            <a:r>
+              <a:rPr lang="tr-TR" sz="1200" dirty="0" err="1">
+                <a:latin typeface="+mj-lt"/>
+                <a:ea typeface="Calibri"/>
+                <a:cs typeface="Calibri"/>
+                <a:sym typeface="Calibri"/>
+              </a:rPr>
+              <a:t>controllers</a:t>
+            </a:r>
+            <a:r>
+              <a:rPr lang="tr-TR" sz="1200" dirty="0">
+                <a:latin typeface="+mj-lt"/>
+                <a:ea typeface="Calibri"/>
+                <a:cs typeface="Calibri"/>
+                <a:sym typeface="Calibri"/>
+              </a:rPr>
+              <a:t> </a:t>
+            </a:r>
+            <a:r>
+              <a:rPr lang="tr-TR" sz="1200" dirty="0" err="1">
+                <a:latin typeface="+mj-lt"/>
+                <a:ea typeface="Calibri"/>
+                <a:cs typeface="Calibri"/>
+                <a:sym typeface="Calibri"/>
+              </a:rPr>
+              <a:t>have</a:t>
+            </a:r>
+            <a:r>
+              <a:rPr lang="tr-TR" sz="1200" dirty="0">
+                <a:latin typeface="+mj-lt"/>
+                <a:ea typeface="Calibri"/>
+                <a:cs typeface="Calibri"/>
+                <a:sym typeface="Calibri"/>
+              </a:rPr>
+              <a:t> </a:t>
+            </a:r>
+            <a:r>
+              <a:rPr lang="tr-TR" sz="1200" dirty="0" err="1">
+                <a:latin typeface="+mj-lt"/>
+                <a:ea typeface="Calibri"/>
+                <a:cs typeface="Calibri"/>
+                <a:sym typeface="Calibri"/>
+              </a:rPr>
+              <a:t>some</a:t>
+            </a:r>
+            <a:r>
+              <a:rPr lang="tr-TR" sz="1200" dirty="0">
+                <a:latin typeface="+mj-lt"/>
+                <a:ea typeface="Calibri"/>
+                <a:cs typeface="Calibri"/>
+                <a:sym typeface="Calibri"/>
+              </a:rPr>
+              <a:t> </a:t>
+            </a:r>
+            <a:r>
+              <a:rPr lang="tr-TR" sz="1200" dirty="0" err="1">
+                <a:latin typeface="+mj-lt"/>
+                <a:ea typeface="Calibri"/>
+                <a:cs typeface="Calibri"/>
+                <a:sym typeface="Calibri"/>
+              </a:rPr>
+              <a:t>limitations</a:t>
+            </a:r>
+            <a:r>
+              <a:rPr lang="tr-TR" sz="1200" dirty="0">
+                <a:latin typeface="+mj-lt"/>
+                <a:ea typeface="Calibri"/>
+                <a:cs typeface="Calibri"/>
+                <a:sym typeface="Calibri"/>
+              </a:rPr>
+              <a:t>.</a:t>
+            </a:r>
           </a:p>
         </p:txBody>
       </p:sp>
@@ -5156,6 +5961,154 @@
               </a:spcAft>
               <a:buNone/>
             </a:pPr>
+            <a:r>
+              <a:rPr lang="tr-TR" noProof="0" dirty="0"/>
+              <a:t>PID </a:t>
+            </a:r>
+            <a:r>
+              <a:rPr lang="tr-TR" noProof="0" dirty="0" err="1"/>
+              <a:t>controllers</a:t>
+            </a:r>
+            <a:r>
+              <a:rPr lang="tr-TR" noProof="0" dirty="0"/>
+              <a:t> </a:t>
+            </a:r>
+            <a:r>
+              <a:rPr lang="tr-TR" noProof="0" dirty="0" err="1"/>
+              <a:t>sensitive</a:t>
+            </a:r>
+            <a:r>
+              <a:rPr lang="tr-TR" noProof="0" dirty="0"/>
+              <a:t> </a:t>
+            </a:r>
+            <a:r>
+              <a:rPr lang="tr-TR" noProof="0" dirty="0" err="1"/>
+              <a:t>to</a:t>
+            </a:r>
+            <a:r>
+              <a:rPr lang="tr-TR" noProof="0" dirty="0"/>
+              <a:t> </a:t>
+            </a:r>
+            <a:r>
+              <a:rPr lang="tr-TR" noProof="0" dirty="0" err="1"/>
+              <a:t>varying</a:t>
+            </a:r>
+            <a:r>
+              <a:rPr lang="tr-TR" noProof="0" dirty="0"/>
+              <a:t> </a:t>
+            </a:r>
+            <a:r>
+              <a:rPr lang="tr-TR" noProof="0" dirty="0" err="1"/>
+              <a:t>environment</a:t>
+            </a:r>
+            <a:r>
+              <a:rPr lang="tr-TR" noProof="0" dirty="0"/>
+              <a:t> </a:t>
+            </a:r>
+            <a:r>
+              <a:rPr lang="tr-TR" noProof="0" dirty="0" err="1"/>
+              <a:t>conditions</a:t>
+            </a:r>
+            <a:r>
+              <a:rPr lang="tr-TR" noProof="0" dirty="0"/>
+              <a:t>. </a:t>
+            </a:r>
+            <a:r>
+              <a:rPr lang="tr-TR" noProof="0" dirty="0" err="1"/>
+              <a:t>Therefore</a:t>
+            </a:r>
+            <a:r>
+              <a:rPr lang="tr-TR" noProof="0" dirty="0"/>
+              <a:t>, at </a:t>
+            </a:r>
+            <a:r>
+              <a:rPr lang="tr-TR" noProof="0" dirty="0" err="1"/>
+              <a:t>the</a:t>
+            </a:r>
+            <a:r>
+              <a:rPr lang="tr-TR" noProof="0" dirty="0"/>
+              <a:t> </a:t>
+            </a:r>
+            <a:r>
+              <a:rPr lang="tr-TR" noProof="0" dirty="0" err="1"/>
+              <a:t>different</a:t>
+            </a:r>
+            <a:r>
+              <a:rPr lang="tr-TR" noProof="0" dirty="0"/>
+              <a:t> </a:t>
+            </a:r>
+            <a:r>
+              <a:rPr lang="tr-TR" noProof="0" dirty="0" err="1"/>
+              <a:t>environment</a:t>
+            </a:r>
+            <a:r>
+              <a:rPr lang="tr-TR" noProof="0" dirty="0"/>
+              <a:t>, </a:t>
+            </a:r>
+            <a:r>
+              <a:rPr lang="tr-TR" noProof="0" dirty="0" err="1"/>
+              <a:t>climate</a:t>
+            </a:r>
+            <a:r>
+              <a:rPr lang="tr-TR" noProof="0" dirty="0"/>
+              <a:t> </a:t>
+            </a:r>
+            <a:r>
+              <a:rPr lang="tr-TR" noProof="0" dirty="0" err="1"/>
+              <a:t>or</a:t>
+            </a:r>
+            <a:r>
+              <a:rPr lang="tr-TR" noProof="0" dirty="0"/>
+              <a:t> </a:t>
+            </a:r>
+            <a:r>
+              <a:rPr lang="tr-TR" noProof="0" dirty="0" err="1"/>
+              <a:t>mission</a:t>
+            </a:r>
+            <a:r>
+              <a:rPr lang="tr-TR" noProof="0" dirty="0"/>
+              <a:t> </a:t>
+            </a:r>
+            <a:r>
+              <a:rPr lang="tr-TR" noProof="0" dirty="0" err="1"/>
+              <a:t>conditions</a:t>
+            </a:r>
+            <a:r>
+              <a:rPr lang="tr-TR" noProof="0" dirty="0"/>
+              <a:t> </a:t>
+            </a:r>
+            <a:r>
+              <a:rPr lang="tr-TR" noProof="0" dirty="0" err="1"/>
+              <a:t>flight</a:t>
+            </a:r>
+            <a:r>
+              <a:rPr lang="tr-TR" noProof="0" dirty="0"/>
+              <a:t> </a:t>
+            </a:r>
+            <a:r>
+              <a:rPr lang="tr-TR" noProof="0" dirty="0" err="1"/>
+              <a:t>perfromance</a:t>
+            </a:r>
+            <a:r>
+              <a:rPr lang="tr-TR" noProof="0" dirty="0"/>
+              <a:t> </a:t>
+            </a:r>
+            <a:r>
+              <a:rPr lang="tr-TR" noProof="0" dirty="0" err="1"/>
+              <a:t>fall</a:t>
+            </a:r>
+            <a:r>
+              <a:rPr lang="tr-TR" noProof="0" dirty="0"/>
+              <a:t> </a:t>
+            </a:r>
+            <a:r>
+              <a:rPr lang="tr-TR" noProof="0" dirty="0" err="1"/>
+              <a:t>seriously</a:t>
+            </a:r>
+            <a:r>
+              <a:rPr lang="tr-TR" noProof="0" dirty="0"/>
+              <a:t>. </a:t>
+            </a:r>
             <a:endParaRPr lang="en-US" noProof="0" dirty="0"/>
           </a:p>
         </p:txBody>
@@ -5325,6 +6278,294 @@
               </a:spcAft>
               <a:buNone/>
             </a:pPr>
+            <a:r>
+              <a:rPr lang="tr-TR" noProof="0" dirty="0" err="1"/>
+              <a:t>When</a:t>
+            </a:r>
+            <a:r>
+              <a:rPr lang="tr-TR" noProof="0" dirty="0"/>
+              <a:t> </a:t>
+            </a:r>
+            <a:r>
+              <a:rPr lang="tr-TR" noProof="0" dirty="0" err="1"/>
+              <a:t>we</a:t>
+            </a:r>
+            <a:r>
+              <a:rPr lang="tr-TR" noProof="0" dirty="0"/>
+              <a:t> </a:t>
+            </a:r>
+            <a:r>
+              <a:rPr lang="tr-TR" noProof="0" dirty="0" err="1"/>
+              <a:t>look</a:t>
+            </a:r>
+            <a:r>
+              <a:rPr lang="tr-TR" noProof="0" dirty="0"/>
+              <a:t> at </a:t>
+            </a:r>
+            <a:r>
+              <a:rPr lang="tr-TR" noProof="0" dirty="0" err="1"/>
+              <a:t>why</a:t>
+            </a:r>
+            <a:r>
+              <a:rPr lang="tr-TR" noProof="0" dirty="0"/>
+              <a:t> </a:t>
+            </a:r>
+            <a:r>
+              <a:rPr lang="tr-TR" noProof="0" dirty="0" err="1"/>
+              <a:t>we</a:t>
+            </a:r>
+            <a:r>
+              <a:rPr lang="tr-TR" noProof="0" dirty="0"/>
+              <a:t> </a:t>
+            </a:r>
+            <a:r>
+              <a:rPr lang="tr-TR" noProof="0" dirty="0" err="1"/>
+              <a:t>used</a:t>
+            </a:r>
+            <a:r>
+              <a:rPr lang="tr-TR" noProof="0" dirty="0"/>
+              <a:t> RL </a:t>
+            </a:r>
+            <a:r>
+              <a:rPr lang="tr-TR" noProof="0" dirty="0" err="1"/>
+              <a:t>algorithms</a:t>
+            </a:r>
+            <a:r>
+              <a:rPr lang="tr-TR" noProof="0" dirty="0"/>
+              <a:t>, </a:t>
+            </a:r>
+            <a:r>
+              <a:rPr lang="tr-TR" noProof="0" dirty="0" err="1"/>
+              <a:t>Their</a:t>
+            </a:r>
+            <a:r>
+              <a:rPr lang="tr-TR" noProof="0" dirty="0"/>
+              <a:t> </a:t>
+            </a:r>
+            <a:r>
+              <a:rPr lang="tr-TR" noProof="0" dirty="0" err="1"/>
+              <a:t>advantages</a:t>
+            </a:r>
+            <a:r>
+              <a:rPr lang="tr-TR" noProof="0" dirty="0"/>
+              <a:t> </a:t>
+            </a:r>
+            <a:r>
+              <a:rPr lang="tr-TR" noProof="0" dirty="0" err="1"/>
+              <a:t>are</a:t>
+            </a:r>
+            <a:r>
+              <a:rPr lang="tr-TR" noProof="0" dirty="0"/>
+              <a:t> self </a:t>
+            </a:r>
+            <a:r>
+              <a:rPr lang="tr-TR" noProof="0" dirty="0" err="1"/>
+              <a:t>learning</a:t>
+            </a:r>
+            <a:r>
+              <a:rPr lang="tr-TR" noProof="0" dirty="0"/>
+              <a:t> </a:t>
+            </a:r>
+            <a:r>
+              <a:rPr lang="tr-TR" noProof="0" dirty="0" err="1"/>
+              <a:t>mechanism</a:t>
+            </a:r>
+            <a:r>
+              <a:rPr lang="tr-TR" noProof="0" dirty="0"/>
+              <a:t> </a:t>
+            </a:r>
+            <a:r>
+              <a:rPr lang="tr-TR" noProof="0" dirty="0" err="1"/>
+              <a:t>and</a:t>
+            </a:r>
+            <a:r>
+              <a:rPr lang="tr-TR" noProof="0" dirty="0"/>
+              <a:t> </a:t>
+            </a:r>
+            <a:r>
+              <a:rPr lang="tr-TR" noProof="0" dirty="0" err="1"/>
+              <a:t>adaptability</a:t>
+            </a:r>
+            <a:r>
+              <a:rPr lang="tr-TR" noProof="0" dirty="0"/>
+              <a:t>. </a:t>
+            </a:r>
+            <a:r>
+              <a:rPr lang="tr-TR" noProof="0" dirty="0" err="1"/>
+              <a:t>Reinforcement</a:t>
+            </a:r>
+            <a:r>
+              <a:rPr lang="tr-TR" noProof="0" dirty="0"/>
+              <a:t> </a:t>
+            </a:r>
+            <a:r>
+              <a:rPr lang="tr-TR" noProof="0" dirty="0" err="1"/>
+              <a:t>learning</a:t>
+            </a:r>
+            <a:r>
+              <a:rPr lang="tr-TR" noProof="0" dirty="0"/>
+              <a:t> is an </a:t>
+            </a:r>
+            <a:r>
+              <a:rPr lang="tr-TR" noProof="0" dirty="0" err="1"/>
+              <a:t>machine</a:t>
+            </a:r>
+            <a:r>
+              <a:rPr lang="tr-TR" noProof="0" dirty="0"/>
+              <a:t> </a:t>
+            </a:r>
+            <a:r>
+              <a:rPr lang="tr-TR" noProof="0" dirty="0" err="1"/>
+              <a:t>learning</a:t>
+            </a:r>
+            <a:r>
+              <a:rPr lang="tr-TR" noProof="0" dirty="0"/>
+              <a:t> </a:t>
+            </a:r>
+            <a:r>
+              <a:rPr lang="tr-TR" noProof="0" dirty="0" err="1"/>
+              <a:t>subfield</a:t>
+            </a:r>
+            <a:r>
+              <a:rPr lang="tr-TR" noProof="0" dirty="0"/>
+              <a:t> </a:t>
+            </a:r>
+            <a:r>
+              <a:rPr lang="tr-TR" noProof="0" dirty="0" err="1"/>
+              <a:t>and</a:t>
+            </a:r>
+            <a:r>
+              <a:rPr lang="tr-TR" noProof="0" dirty="0"/>
+              <a:t> </a:t>
+            </a:r>
+            <a:r>
+              <a:rPr lang="tr-TR" noProof="0" dirty="0" err="1"/>
+              <a:t>hence</a:t>
+            </a:r>
+            <a:r>
+              <a:rPr lang="tr-TR" noProof="0" dirty="0"/>
+              <a:t> it has </a:t>
+            </a:r>
+            <a:r>
+              <a:rPr lang="tr-TR" noProof="0" dirty="0" err="1"/>
+              <a:t>capable</a:t>
+            </a:r>
+            <a:r>
+              <a:rPr lang="tr-TR" noProof="0" dirty="0"/>
+              <a:t> </a:t>
+            </a:r>
+            <a:r>
+              <a:rPr lang="tr-TR" noProof="0" dirty="0" err="1"/>
+              <a:t>to</a:t>
+            </a:r>
+            <a:r>
+              <a:rPr lang="tr-TR" noProof="0" dirty="0"/>
+              <a:t> </a:t>
+            </a:r>
+            <a:r>
+              <a:rPr lang="tr-TR" noProof="0" dirty="0" err="1"/>
+              <a:t>learn</a:t>
+            </a:r>
+            <a:r>
+              <a:rPr lang="tr-TR" noProof="0" dirty="0"/>
+              <a:t> </a:t>
+            </a:r>
+            <a:r>
+              <a:rPr lang="tr-TR" noProof="0" dirty="0" err="1"/>
+              <a:t>by</a:t>
+            </a:r>
+            <a:r>
+              <a:rPr lang="tr-TR" noProof="0" dirty="0"/>
+              <a:t> </a:t>
+            </a:r>
+            <a:r>
+              <a:rPr lang="tr-TR" noProof="0" dirty="0" err="1"/>
+              <a:t>training</a:t>
+            </a:r>
+            <a:r>
+              <a:rPr lang="tr-TR" noProof="0" dirty="0"/>
+              <a:t>. </a:t>
+            </a:r>
+            <a:r>
+              <a:rPr lang="tr-TR" noProof="0" dirty="0" err="1"/>
+              <a:t>And</a:t>
+            </a:r>
+            <a:r>
+              <a:rPr lang="tr-TR" noProof="0" dirty="0"/>
+              <a:t> </a:t>
+            </a:r>
+            <a:r>
+              <a:rPr lang="tr-TR" noProof="0" dirty="0" err="1"/>
+              <a:t>this</a:t>
+            </a:r>
+            <a:r>
+              <a:rPr lang="tr-TR" noProof="0" dirty="0"/>
+              <a:t> </a:t>
+            </a:r>
+            <a:r>
+              <a:rPr lang="tr-TR" noProof="0" dirty="0" err="1"/>
+              <a:t>training</a:t>
+            </a:r>
+            <a:r>
+              <a:rPr lang="tr-TR" noProof="0" dirty="0"/>
+              <a:t> </a:t>
+            </a:r>
+            <a:r>
+              <a:rPr lang="tr-TR" noProof="0" dirty="0" err="1"/>
+              <a:t>make</a:t>
+            </a:r>
+            <a:r>
+              <a:rPr lang="tr-TR" noProof="0" dirty="0"/>
+              <a:t> it </a:t>
+            </a:r>
+            <a:r>
+              <a:rPr lang="tr-TR" noProof="0" dirty="0" err="1"/>
+              <a:t>adapts</a:t>
+            </a:r>
+            <a:r>
+              <a:rPr lang="tr-TR" noProof="0" dirty="0"/>
+              <a:t> </a:t>
+            </a:r>
+            <a:r>
+              <a:rPr lang="tr-TR" noProof="0" dirty="0" err="1"/>
+              <a:t>to</a:t>
+            </a:r>
+            <a:r>
+              <a:rPr lang="tr-TR" noProof="0" dirty="0"/>
+              <a:t> </a:t>
+            </a:r>
+            <a:r>
+              <a:rPr lang="tr-TR" noProof="0" dirty="0" err="1"/>
+              <a:t>varying</a:t>
+            </a:r>
+            <a:r>
+              <a:rPr lang="tr-TR" noProof="0" dirty="0"/>
+              <a:t> </a:t>
+            </a:r>
+            <a:r>
+              <a:rPr lang="tr-TR" noProof="0" dirty="0" err="1"/>
+              <a:t>environment</a:t>
+            </a:r>
+            <a:r>
+              <a:rPr lang="tr-TR" noProof="0" dirty="0"/>
+              <a:t> </a:t>
+            </a:r>
+            <a:r>
+              <a:rPr lang="tr-TR" noProof="0" dirty="0" err="1"/>
+              <a:t>conditions</a:t>
+            </a:r>
+            <a:r>
+              <a:rPr lang="tr-TR" noProof="0" dirty="0"/>
+              <a:t> </a:t>
+            </a:r>
+            <a:r>
+              <a:rPr lang="tr-TR" noProof="0" dirty="0" err="1"/>
+              <a:t>easily</a:t>
+            </a:r>
+            <a:r>
+              <a:rPr lang="tr-TR" noProof="0" dirty="0"/>
+              <a:t>.</a:t>
+            </a:r>
             <a:endParaRPr lang="en-US" noProof="0" dirty="0"/>
           </a:p>
         </p:txBody>
@@ -5494,6 +6735,425 @@
               </a:spcAft>
               <a:buNone/>
             </a:pPr>
+            <a:r>
+              <a:rPr lang="tr-TR" noProof="0" dirty="0" err="1"/>
+              <a:t>One</a:t>
+            </a:r>
+            <a:r>
+              <a:rPr lang="tr-TR" noProof="0" dirty="0"/>
+              <a:t> of </a:t>
+            </a:r>
+            <a:r>
+              <a:rPr lang="tr-TR" noProof="0" dirty="0" err="1"/>
+              <a:t>the</a:t>
+            </a:r>
+            <a:r>
+              <a:rPr lang="tr-TR" noProof="0" dirty="0"/>
+              <a:t> </a:t>
+            </a:r>
+            <a:r>
+              <a:rPr lang="tr-TR" noProof="0" dirty="0" err="1"/>
+              <a:t>most</a:t>
+            </a:r>
+            <a:r>
+              <a:rPr lang="tr-TR" noProof="0" dirty="0"/>
+              <a:t> </a:t>
+            </a:r>
+            <a:r>
+              <a:rPr lang="tr-TR" noProof="0" dirty="0" err="1"/>
+              <a:t>common</a:t>
+            </a:r>
+            <a:r>
+              <a:rPr lang="tr-TR" noProof="0" dirty="0"/>
+              <a:t> </a:t>
+            </a:r>
+            <a:r>
+              <a:rPr lang="tr-TR" noProof="0" dirty="0" err="1"/>
+              <a:t>used</a:t>
+            </a:r>
+            <a:r>
+              <a:rPr lang="tr-TR" noProof="0" dirty="0"/>
+              <a:t> </a:t>
+            </a:r>
+            <a:r>
+              <a:rPr lang="tr-TR" noProof="0" dirty="0" err="1"/>
+              <a:t>method</a:t>
+            </a:r>
+            <a:r>
+              <a:rPr lang="tr-TR" noProof="0" dirty="0"/>
+              <a:t> is DDPG </a:t>
+            </a:r>
+            <a:r>
+              <a:rPr lang="tr-TR" noProof="0" dirty="0" err="1"/>
+              <a:t>algorithm</a:t>
+            </a:r>
+            <a:r>
+              <a:rPr lang="tr-TR" noProof="0" dirty="0"/>
+              <a:t>. </a:t>
+            </a:r>
+            <a:r>
+              <a:rPr lang="tr-TR" noProof="0" dirty="0" err="1"/>
+              <a:t>It</a:t>
+            </a:r>
+            <a:r>
+              <a:rPr lang="tr-TR" noProof="0" dirty="0"/>
+              <a:t> is an </a:t>
+            </a:r>
+            <a:r>
+              <a:rPr lang="tr-TR" noProof="0" dirty="0" err="1"/>
+              <a:t>continuous</a:t>
+            </a:r>
+            <a:r>
+              <a:rPr lang="tr-TR" noProof="0" dirty="0"/>
+              <a:t> </a:t>
+            </a:r>
+            <a:r>
+              <a:rPr lang="tr-TR" noProof="0" dirty="0" err="1"/>
+              <a:t>system</a:t>
+            </a:r>
+            <a:r>
+              <a:rPr lang="tr-TR" noProof="0" dirty="0"/>
+              <a:t> </a:t>
+            </a:r>
+            <a:r>
+              <a:rPr lang="tr-TR" noProof="0" dirty="0" err="1"/>
+              <a:t>and</a:t>
+            </a:r>
+            <a:r>
+              <a:rPr lang="tr-TR" noProof="0" dirty="0"/>
+              <a:t> </a:t>
+            </a:r>
+            <a:r>
+              <a:rPr lang="tr-TR" noProof="0" dirty="0" err="1"/>
+              <a:t>therefore</a:t>
+            </a:r>
+            <a:r>
+              <a:rPr lang="tr-TR" noProof="0" dirty="0"/>
+              <a:t> </a:t>
+            </a:r>
+            <a:r>
+              <a:rPr lang="tr-TR" noProof="0" dirty="0" err="1"/>
+              <a:t>usable</a:t>
+            </a:r>
+            <a:r>
+              <a:rPr lang="tr-TR" noProof="0" dirty="0"/>
+              <a:t> in </a:t>
+            </a:r>
+            <a:r>
+              <a:rPr lang="tr-TR" noProof="0" dirty="0" err="1"/>
+              <a:t>the</a:t>
+            </a:r>
+            <a:r>
+              <a:rPr lang="tr-TR" noProof="0" dirty="0"/>
+              <a:t> </a:t>
+            </a:r>
+            <a:r>
+              <a:rPr lang="tr-TR" noProof="0" dirty="0" err="1"/>
+              <a:t>UAV’s</a:t>
+            </a:r>
+            <a:endParaRPr lang="tr-TR" noProof="0" dirty="0"/>
+          </a:p>
+          <a:p>
+            <a:pPr marL="0" lvl="0" indent="0" algn="l" rtl="0">
+              <a:spcBef>
+                <a:spcPts val="0"/>
+              </a:spcBef>
+              <a:spcAft>
+                <a:spcPts val="0"/>
+              </a:spcAft>
+              <a:buNone/>
+            </a:pPr>
+            <a:r>
+              <a:rPr lang="tr-TR" noProof="0" dirty="0" err="1"/>
+              <a:t>It</a:t>
+            </a:r>
+            <a:r>
+              <a:rPr lang="tr-TR" noProof="0" dirty="0"/>
+              <a:t> </a:t>
+            </a:r>
+            <a:r>
+              <a:rPr lang="tr-TR" noProof="0" dirty="0" err="1"/>
+              <a:t>consists</a:t>
+            </a:r>
+            <a:r>
+              <a:rPr lang="tr-TR" noProof="0" dirty="0"/>
+              <a:t> of </a:t>
+            </a:r>
+            <a:r>
+              <a:rPr lang="tr-TR" noProof="0" dirty="0" err="1"/>
+              <a:t>the</a:t>
+            </a:r>
+            <a:r>
+              <a:rPr lang="tr-TR" noProof="0" dirty="0"/>
+              <a:t> </a:t>
+            </a:r>
+            <a:r>
+              <a:rPr lang="tr-TR" noProof="0" dirty="0" err="1"/>
+              <a:t>actor</a:t>
+            </a:r>
+            <a:r>
+              <a:rPr lang="tr-TR" noProof="0" dirty="0"/>
+              <a:t> </a:t>
+            </a:r>
+            <a:r>
+              <a:rPr lang="tr-TR" noProof="0" dirty="0" err="1"/>
+              <a:t>and</a:t>
+            </a:r>
+            <a:r>
+              <a:rPr lang="tr-TR" noProof="0" dirty="0"/>
+              <a:t> </a:t>
+            </a:r>
+            <a:r>
+              <a:rPr lang="tr-TR" noProof="0" dirty="0" err="1"/>
+              <a:t>critic</a:t>
+            </a:r>
+            <a:r>
+              <a:rPr lang="tr-TR" noProof="0" dirty="0"/>
+              <a:t> </a:t>
+            </a:r>
+            <a:r>
+              <a:rPr lang="tr-TR" noProof="0" dirty="0" err="1"/>
+              <a:t>networks</a:t>
+            </a:r>
+            <a:r>
+              <a:rPr lang="tr-TR" noProof="0" dirty="0"/>
+              <a:t>. </a:t>
+            </a:r>
+            <a:r>
+              <a:rPr lang="tr-TR" noProof="0" dirty="0" err="1"/>
+              <a:t>Actor</a:t>
+            </a:r>
+            <a:r>
+              <a:rPr lang="tr-TR" noProof="0" dirty="0"/>
+              <a:t> network </a:t>
+            </a:r>
+            <a:r>
+              <a:rPr lang="tr-TR" noProof="0" dirty="0" err="1"/>
+              <a:t>takes</a:t>
+            </a:r>
+            <a:r>
+              <a:rPr lang="tr-TR" noProof="0" dirty="0"/>
+              <a:t> </a:t>
+            </a:r>
+            <a:r>
+              <a:rPr lang="tr-TR" noProof="0" dirty="0" err="1"/>
+              <a:t>the</a:t>
+            </a:r>
+            <a:r>
+              <a:rPr lang="tr-TR" noProof="0" dirty="0"/>
+              <a:t> </a:t>
+            </a:r>
+            <a:r>
+              <a:rPr lang="tr-TR" noProof="0" dirty="0" err="1"/>
+              <a:t>states</a:t>
+            </a:r>
+            <a:r>
+              <a:rPr lang="tr-TR" noProof="0" dirty="0"/>
+              <a:t> </a:t>
+            </a:r>
+            <a:r>
+              <a:rPr lang="tr-TR" noProof="0" dirty="0" err="1"/>
+              <a:t>and</a:t>
+            </a:r>
+            <a:r>
+              <a:rPr lang="tr-TR" noProof="0" dirty="0"/>
+              <a:t> </a:t>
+            </a:r>
+            <a:r>
+              <a:rPr lang="tr-TR" noProof="0" dirty="0" err="1"/>
+              <a:t>returns</a:t>
+            </a:r>
+            <a:r>
+              <a:rPr lang="tr-TR" noProof="0" dirty="0"/>
+              <a:t> </a:t>
+            </a:r>
+            <a:r>
+              <a:rPr lang="tr-TR" noProof="0" dirty="0" err="1"/>
+              <a:t>actions</a:t>
+            </a:r>
+            <a:r>
+              <a:rPr lang="tr-TR" noProof="0" dirty="0"/>
+              <a:t>.</a:t>
+            </a:r>
+          </a:p>
+          <a:p>
+            <a:pPr marL="0" lvl="0" indent="0" algn="l" rtl="0">
+              <a:spcBef>
+                <a:spcPts val="0"/>
+              </a:spcBef>
+              <a:spcAft>
+                <a:spcPts val="0"/>
+              </a:spcAft>
+              <a:buNone/>
+            </a:pPr>
+            <a:r>
+              <a:rPr lang="tr-TR" noProof="0" dirty="0" err="1"/>
+              <a:t>Critic</a:t>
+            </a:r>
+            <a:r>
+              <a:rPr lang="tr-TR" noProof="0" dirty="0"/>
+              <a:t> network </a:t>
+            </a:r>
+            <a:r>
+              <a:rPr lang="tr-TR" noProof="0" dirty="0" err="1"/>
+              <a:t>gets</a:t>
+            </a:r>
+            <a:r>
+              <a:rPr lang="tr-TR" noProof="0" dirty="0"/>
+              <a:t> </a:t>
+            </a:r>
+            <a:r>
+              <a:rPr lang="tr-TR" noProof="0" dirty="0" err="1"/>
+              <a:t>the</a:t>
+            </a:r>
+            <a:r>
+              <a:rPr lang="tr-TR" noProof="0" dirty="0"/>
+              <a:t> </a:t>
+            </a:r>
+            <a:r>
+              <a:rPr lang="tr-TR" noProof="0" dirty="0" err="1"/>
+              <a:t>state</a:t>
+            </a:r>
+            <a:r>
+              <a:rPr lang="tr-TR" noProof="0" dirty="0"/>
+              <a:t> </a:t>
+            </a:r>
+            <a:r>
+              <a:rPr lang="tr-TR" noProof="0" dirty="0" err="1"/>
+              <a:t>and</a:t>
+            </a:r>
+            <a:r>
+              <a:rPr lang="tr-TR" noProof="0" dirty="0"/>
+              <a:t> </a:t>
+            </a:r>
+            <a:r>
+              <a:rPr lang="tr-TR" noProof="0" dirty="0" err="1"/>
+              <a:t>action</a:t>
+            </a:r>
+            <a:r>
+              <a:rPr lang="tr-TR" noProof="0" dirty="0"/>
+              <a:t> as </a:t>
+            </a:r>
+            <a:r>
+              <a:rPr lang="tr-TR" noProof="0" dirty="0" err="1"/>
+              <a:t>input</a:t>
+            </a:r>
+            <a:r>
+              <a:rPr lang="tr-TR" noProof="0" dirty="0"/>
+              <a:t> </a:t>
+            </a:r>
+            <a:r>
+              <a:rPr lang="tr-TR" noProof="0" dirty="0" err="1"/>
+              <a:t>and</a:t>
+            </a:r>
+            <a:r>
+              <a:rPr lang="tr-TR" noProof="0" dirty="0"/>
+              <a:t> </a:t>
+            </a:r>
+            <a:r>
+              <a:rPr lang="tr-TR" noProof="0" dirty="0" err="1"/>
+              <a:t>returns</a:t>
+            </a:r>
+            <a:r>
+              <a:rPr lang="tr-TR" noProof="0" dirty="0"/>
+              <a:t> </a:t>
+            </a:r>
+            <a:r>
+              <a:rPr lang="tr-TR" noProof="0" dirty="0" err="1"/>
+              <a:t>the</a:t>
+            </a:r>
+            <a:r>
+              <a:rPr lang="tr-TR" noProof="0" dirty="0"/>
+              <a:t> </a:t>
+            </a:r>
+            <a:r>
+              <a:rPr lang="tr-TR" noProof="0" dirty="0" err="1"/>
+              <a:t>best</a:t>
+            </a:r>
+            <a:r>
+              <a:rPr lang="tr-TR" noProof="0" dirty="0"/>
+              <a:t> </a:t>
+            </a:r>
+            <a:r>
+              <a:rPr lang="tr-TR" noProof="0" dirty="0" err="1"/>
+              <a:t>action</a:t>
+            </a:r>
+            <a:r>
+              <a:rPr lang="tr-TR" noProof="0" dirty="0"/>
+              <a:t>. </a:t>
+            </a:r>
+            <a:r>
+              <a:rPr lang="tr-TR" noProof="0" dirty="0" err="1"/>
+              <a:t>This</a:t>
+            </a:r>
+            <a:r>
+              <a:rPr lang="tr-TR" noProof="0" dirty="0"/>
+              <a:t> </a:t>
+            </a:r>
+            <a:r>
+              <a:rPr lang="tr-TR" noProof="0" dirty="0" err="1"/>
+              <a:t>best</a:t>
+            </a:r>
+            <a:r>
+              <a:rPr lang="tr-TR" noProof="0" dirty="0"/>
+              <a:t> </a:t>
+            </a:r>
+            <a:r>
+              <a:rPr lang="tr-TR" noProof="0" dirty="0" err="1"/>
+              <a:t>action</a:t>
+            </a:r>
+            <a:r>
+              <a:rPr lang="tr-TR" noProof="0" dirty="0"/>
+              <a:t> </a:t>
+            </a:r>
+            <a:r>
+              <a:rPr lang="tr-TR" noProof="0" dirty="0" err="1"/>
+              <a:t>evaluated</a:t>
+            </a:r>
+            <a:r>
+              <a:rPr lang="tr-TR" noProof="0" dirty="0"/>
+              <a:t> </a:t>
+            </a:r>
+            <a:r>
+              <a:rPr lang="tr-TR" noProof="0" dirty="0" err="1"/>
+              <a:t>with</a:t>
+            </a:r>
+            <a:r>
+              <a:rPr lang="tr-TR" noProof="0" dirty="0"/>
+              <a:t> </a:t>
+            </a:r>
+            <a:r>
+              <a:rPr lang="tr-TR" noProof="0" dirty="0" err="1"/>
+              <a:t>the</a:t>
+            </a:r>
+            <a:r>
+              <a:rPr lang="tr-TR" noProof="0" dirty="0"/>
+              <a:t> </a:t>
+            </a:r>
+            <a:r>
+              <a:rPr lang="tr-TR" noProof="0" dirty="0" err="1"/>
+              <a:t>long</a:t>
+            </a:r>
+            <a:r>
+              <a:rPr lang="tr-TR" noProof="0" dirty="0"/>
+              <a:t> </a:t>
+            </a:r>
+            <a:r>
+              <a:rPr lang="tr-TR" noProof="0" dirty="0" err="1"/>
+              <a:t>term</a:t>
+            </a:r>
+            <a:r>
+              <a:rPr lang="tr-TR" noProof="0" dirty="0"/>
+              <a:t> </a:t>
+            </a:r>
+            <a:r>
+              <a:rPr lang="tr-TR" noProof="0" dirty="0" err="1"/>
+              <a:t>rewards</a:t>
+            </a:r>
+            <a:r>
+              <a:rPr lang="tr-TR" noProof="0" dirty="0"/>
+              <a:t>.</a:t>
+            </a:r>
             <a:endParaRPr lang="en-US" noProof="0" dirty="0"/>
           </a:p>
         </p:txBody>
@@ -5663,14 +7323,7 @@
               </a:spcAft>
               <a:buNone/>
             </a:pPr>
-            <a:r>
-              <a:rPr lang="tr-TR" noProof="0" dirty="0" err="1"/>
-              <a:t>Reward</a:t>
-            </a:r>
-            <a:r>
-              <a:rPr lang="tr-TR" noProof="0" dirty="0"/>
-              <a:t> fonksiyon düzenlenecek</a:t>
-            </a:r>
+            <a:endParaRPr lang="tr-TR" noProof="0" dirty="0"/>
           </a:p>
           <a:p>
             <a:pPr marL="0" lvl="0" indent="0" algn="l" rtl="0">
@@ -5851,6 +7504,421 @@
               </a:spcAft>
               <a:buNone/>
             </a:pPr>
+            <a:r>
+              <a:rPr lang="tr-TR" noProof="0" dirty="0"/>
+              <a:t>PPO </a:t>
+            </a:r>
+            <a:r>
+              <a:rPr lang="tr-TR" noProof="0" dirty="0" err="1"/>
+              <a:t>algorithm</a:t>
+            </a:r>
+            <a:r>
+              <a:rPr lang="tr-TR" noProof="0" dirty="0"/>
+              <a:t> </a:t>
+            </a:r>
+            <a:r>
+              <a:rPr lang="tr-TR" noProof="0" dirty="0" err="1"/>
+              <a:t>also</a:t>
+            </a:r>
+            <a:r>
+              <a:rPr lang="tr-TR" noProof="0" dirty="0"/>
+              <a:t> </a:t>
+            </a:r>
+            <a:r>
+              <a:rPr lang="tr-TR" noProof="0" dirty="0" err="1"/>
+              <a:t>have</a:t>
+            </a:r>
+            <a:r>
+              <a:rPr lang="tr-TR" noProof="0" dirty="0"/>
+              <a:t> </a:t>
+            </a:r>
+            <a:r>
+              <a:rPr lang="tr-TR" noProof="0" dirty="0" err="1"/>
+              <a:t>actor-critic</a:t>
+            </a:r>
+            <a:r>
+              <a:rPr lang="tr-TR" noProof="0" dirty="0"/>
+              <a:t> </a:t>
+            </a:r>
+            <a:r>
+              <a:rPr lang="tr-TR" noProof="0" dirty="0" err="1"/>
+              <a:t>networks</a:t>
+            </a:r>
+            <a:r>
+              <a:rPr lang="tr-TR" noProof="0" dirty="0"/>
+              <a:t> </a:t>
+            </a:r>
+            <a:r>
+              <a:rPr lang="tr-TR" noProof="0" dirty="0" err="1"/>
+              <a:t>and</a:t>
+            </a:r>
+            <a:r>
+              <a:rPr lang="tr-TR" noProof="0" dirty="0"/>
+              <a:t> it  is </a:t>
+            </a:r>
+            <a:r>
+              <a:rPr lang="tr-TR" noProof="0" dirty="0" err="1"/>
+              <a:t>continuous</a:t>
+            </a:r>
+            <a:r>
+              <a:rPr lang="tr-TR" noProof="0" dirty="0"/>
+              <a:t> </a:t>
+            </a:r>
+            <a:r>
+              <a:rPr lang="tr-TR" noProof="0" dirty="0" err="1"/>
+              <a:t>space</a:t>
+            </a:r>
+            <a:r>
+              <a:rPr lang="tr-TR" noProof="0" dirty="0"/>
+              <a:t> </a:t>
+            </a:r>
+            <a:r>
+              <a:rPr lang="tr-TR" noProof="0" dirty="0" err="1"/>
+              <a:t>agent</a:t>
+            </a:r>
+            <a:r>
+              <a:rPr lang="tr-TR" noProof="0" dirty="0"/>
+              <a:t>.</a:t>
+            </a:r>
+          </a:p>
+          <a:p>
+            <a:pPr marL="0" lvl="0" indent="0" algn="l" rtl="0">
+              <a:spcBef>
+                <a:spcPts val="0"/>
+              </a:spcBef>
+              <a:spcAft>
+                <a:spcPts val="0"/>
+              </a:spcAft>
+              <a:buNone/>
+            </a:pPr>
+            <a:r>
+              <a:rPr lang="tr-TR" noProof="0" dirty="0" err="1"/>
+              <a:t>Its</a:t>
+            </a:r>
+            <a:r>
+              <a:rPr lang="tr-TR" noProof="0" dirty="0"/>
+              <a:t> </a:t>
+            </a:r>
+            <a:r>
+              <a:rPr lang="tr-TR" noProof="0" dirty="0" err="1"/>
+              <a:t>working</a:t>
+            </a:r>
+            <a:r>
+              <a:rPr lang="tr-TR" noProof="0" dirty="0"/>
+              <a:t> </a:t>
+            </a:r>
+            <a:r>
+              <a:rPr lang="tr-TR" noProof="0" dirty="0" err="1"/>
+              <a:t>principle</a:t>
+            </a:r>
+            <a:r>
+              <a:rPr lang="tr-TR" noProof="0" dirty="0"/>
+              <a:t> is </a:t>
+            </a:r>
+            <a:r>
+              <a:rPr lang="tr-TR" noProof="0" dirty="0" err="1"/>
+              <a:t>based</a:t>
+            </a:r>
+            <a:r>
+              <a:rPr lang="tr-TR" noProof="0" dirty="0"/>
+              <a:t> on </a:t>
+            </a:r>
+            <a:r>
+              <a:rPr lang="tr-TR" noProof="0" dirty="0" err="1"/>
+              <a:t>small</a:t>
+            </a:r>
+            <a:r>
+              <a:rPr lang="tr-TR" noProof="0" dirty="0"/>
+              <a:t> </a:t>
+            </a:r>
+            <a:r>
+              <a:rPr lang="tr-TR" noProof="0" dirty="0" err="1"/>
+              <a:t>steps</a:t>
+            </a:r>
+            <a:r>
+              <a:rPr lang="tr-TR" noProof="0" dirty="0"/>
+              <a:t> in </a:t>
+            </a:r>
+            <a:r>
+              <a:rPr lang="tr-TR" noProof="0" dirty="0" err="1"/>
+              <a:t>the</a:t>
+            </a:r>
+            <a:r>
+              <a:rPr lang="tr-TR" noProof="0" dirty="0"/>
+              <a:t> </a:t>
+            </a:r>
+            <a:r>
+              <a:rPr lang="tr-TR" noProof="0" dirty="0" err="1"/>
+              <a:t>trusted</a:t>
+            </a:r>
+            <a:r>
+              <a:rPr lang="tr-TR" noProof="0" dirty="0"/>
+              <a:t> </a:t>
+            </a:r>
+            <a:r>
+              <a:rPr lang="tr-TR" noProof="0" dirty="0" err="1"/>
+              <a:t>region</a:t>
+            </a:r>
+            <a:r>
+              <a:rPr lang="tr-TR" noProof="0" dirty="0"/>
+              <a:t>. </a:t>
+            </a:r>
+            <a:r>
+              <a:rPr lang="tr-TR" noProof="0" dirty="0" err="1"/>
+              <a:t>It’s</a:t>
+            </a:r>
+            <a:r>
+              <a:rPr lang="tr-TR" noProof="0" dirty="0"/>
+              <a:t> </a:t>
+            </a:r>
+            <a:r>
+              <a:rPr lang="tr-TR" noProof="0" dirty="0" err="1"/>
+              <a:t>direction</a:t>
+            </a:r>
+            <a:r>
+              <a:rPr lang="tr-TR" noProof="0" dirty="0"/>
+              <a:t> is </a:t>
+            </a:r>
+            <a:r>
+              <a:rPr lang="tr-TR" noProof="0" dirty="0" err="1"/>
+              <a:t>determined</a:t>
+            </a:r>
+            <a:r>
+              <a:rPr lang="tr-TR" noProof="0" dirty="0"/>
+              <a:t> </a:t>
+            </a:r>
+            <a:r>
+              <a:rPr lang="tr-TR" noProof="0" dirty="0" err="1"/>
+              <a:t>when</a:t>
+            </a:r>
+            <a:r>
+              <a:rPr lang="tr-TR" noProof="0" dirty="0"/>
+              <a:t> </a:t>
+            </a:r>
+            <a:r>
+              <a:rPr lang="tr-TR" noProof="0" dirty="0" err="1"/>
+              <a:t>the</a:t>
+            </a:r>
+            <a:r>
+              <a:rPr lang="tr-TR" noProof="0" dirty="0"/>
+              <a:t> </a:t>
+            </a:r>
+            <a:r>
+              <a:rPr lang="tr-TR" noProof="0" dirty="0" err="1"/>
+              <a:t>best</a:t>
+            </a:r>
+            <a:r>
+              <a:rPr lang="tr-TR" noProof="0" dirty="0"/>
+              <a:t> </a:t>
+            </a:r>
+            <a:r>
+              <a:rPr lang="tr-TR" noProof="0" dirty="0" err="1"/>
+              <a:t>point</a:t>
+            </a:r>
+            <a:r>
+              <a:rPr lang="tr-TR" noProof="0" dirty="0"/>
+              <a:t> is </a:t>
+            </a:r>
+            <a:r>
+              <a:rPr lang="tr-TR" noProof="0" dirty="0" err="1"/>
+              <a:t>found</a:t>
+            </a:r>
+            <a:r>
+              <a:rPr lang="tr-TR" noProof="0" dirty="0"/>
+              <a:t> in </a:t>
+            </a:r>
+            <a:r>
+              <a:rPr lang="tr-TR" noProof="0" dirty="0" err="1"/>
+              <a:t>the</a:t>
+            </a:r>
+            <a:r>
+              <a:rPr lang="tr-TR" noProof="0" dirty="0"/>
+              <a:t> </a:t>
+            </a:r>
+            <a:r>
+              <a:rPr lang="tr-TR" noProof="0" dirty="0" err="1"/>
+              <a:t>circular</a:t>
+            </a:r>
+            <a:r>
+              <a:rPr lang="tr-TR" noProof="0" dirty="0"/>
+              <a:t>. </a:t>
+            </a:r>
+            <a:r>
+              <a:rPr lang="tr-TR" noProof="0" dirty="0" err="1"/>
+              <a:t>Once</a:t>
+            </a:r>
+            <a:r>
+              <a:rPr lang="tr-TR" noProof="0" dirty="0"/>
+              <a:t> </a:t>
+            </a:r>
+            <a:r>
+              <a:rPr lang="tr-TR" noProof="0" dirty="0" err="1"/>
+              <a:t>best</a:t>
+            </a:r>
+            <a:r>
+              <a:rPr lang="tr-TR" noProof="0" dirty="0"/>
+              <a:t> </a:t>
+            </a:r>
+            <a:r>
+              <a:rPr lang="tr-TR" noProof="0" dirty="0" err="1"/>
+              <a:t>point</a:t>
+            </a:r>
+            <a:r>
+              <a:rPr lang="tr-TR" noProof="0" dirty="0"/>
+              <a:t> is </a:t>
+            </a:r>
+            <a:r>
+              <a:rPr lang="tr-TR" noProof="0" dirty="0" err="1"/>
+              <a:t>found</a:t>
+            </a:r>
+            <a:r>
+              <a:rPr lang="tr-TR" noProof="0" dirty="0"/>
+              <a:t> </a:t>
+            </a:r>
+            <a:r>
+              <a:rPr lang="tr-TR" noProof="0" dirty="0" err="1"/>
+              <a:t>new</a:t>
+            </a:r>
+            <a:r>
+              <a:rPr lang="tr-TR" noProof="0" dirty="0"/>
+              <a:t> </a:t>
+            </a:r>
+            <a:r>
+              <a:rPr lang="tr-TR" noProof="0" dirty="0" err="1"/>
+              <a:t>trust</a:t>
+            </a:r>
+            <a:r>
+              <a:rPr lang="tr-TR" noProof="0" dirty="0"/>
+              <a:t> </a:t>
+            </a:r>
+            <a:r>
+              <a:rPr lang="tr-TR" noProof="0" dirty="0" err="1"/>
+              <a:t>region</a:t>
+            </a:r>
+            <a:r>
+              <a:rPr lang="tr-TR" noProof="0" dirty="0"/>
+              <a:t> </a:t>
+            </a:r>
+            <a:r>
+              <a:rPr lang="tr-TR" noProof="0" dirty="0" err="1"/>
+              <a:t>appears</a:t>
+            </a:r>
+            <a:r>
+              <a:rPr lang="tr-TR" noProof="0" dirty="0"/>
+              <a:t> </a:t>
+            </a:r>
+            <a:r>
+              <a:rPr lang="tr-TR" noProof="0" dirty="0" err="1"/>
+              <a:t>and</a:t>
+            </a:r>
+            <a:r>
+              <a:rPr lang="tr-TR" noProof="0" dirty="0"/>
+              <a:t> </a:t>
+            </a:r>
+            <a:r>
+              <a:rPr lang="tr-TR" noProof="0" dirty="0" err="1"/>
+              <a:t>again</a:t>
+            </a:r>
+            <a:r>
+              <a:rPr lang="tr-TR" noProof="0" dirty="0"/>
+              <a:t> </a:t>
+            </a:r>
+            <a:r>
+              <a:rPr lang="tr-TR" noProof="0" dirty="0" err="1"/>
+              <a:t>struggles</a:t>
+            </a:r>
+            <a:r>
+              <a:rPr lang="tr-TR" noProof="0" dirty="0"/>
+              <a:t> </a:t>
+            </a:r>
+            <a:r>
+              <a:rPr lang="tr-TR" noProof="0" dirty="0" err="1"/>
+              <a:t>to</a:t>
+            </a:r>
+            <a:r>
+              <a:rPr lang="tr-TR" noProof="0" dirty="0"/>
+              <a:t> </a:t>
+            </a:r>
+            <a:r>
+              <a:rPr lang="tr-TR" noProof="0" dirty="0" err="1"/>
+              <a:t>find</a:t>
+            </a:r>
+            <a:r>
+              <a:rPr lang="tr-TR" noProof="0" dirty="0"/>
+              <a:t> </a:t>
+            </a:r>
+            <a:r>
+              <a:rPr lang="tr-TR" noProof="0" dirty="0" err="1"/>
+              <a:t>best</a:t>
+            </a:r>
+            <a:r>
+              <a:rPr lang="tr-TR" noProof="0" dirty="0"/>
+              <a:t> </a:t>
+            </a:r>
+            <a:r>
+              <a:rPr lang="tr-TR" noProof="0" dirty="0" err="1"/>
+              <a:t>point</a:t>
+            </a:r>
+            <a:r>
+              <a:rPr lang="tr-TR" noProof="0" dirty="0"/>
+              <a:t>. </a:t>
+            </a:r>
+            <a:r>
+              <a:rPr lang="tr-TR" noProof="0" dirty="0" err="1"/>
+              <a:t>This</a:t>
+            </a:r>
+            <a:r>
+              <a:rPr lang="tr-TR" noProof="0" dirty="0"/>
+              <a:t> </a:t>
+            </a:r>
+            <a:r>
+              <a:rPr lang="tr-TR" noProof="0" dirty="0" err="1"/>
+              <a:t>process</a:t>
+            </a:r>
+            <a:r>
+              <a:rPr lang="tr-TR" noProof="0" dirty="0"/>
+              <a:t> </a:t>
+            </a:r>
+            <a:r>
+              <a:rPr lang="tr-TR" noProof="0" dirty="0" err="1"/>
+              <a:t>continue</a:t>
+            </a:r>
+            <a:r>
+              <a:rPr lang="tr-TR" noProof="0" dirty="0"/>
+              <a:t> </a:t>
+            </a:r>
+            <a:r>
+              <a:rPr lang="tr-TR" noProof="0" dirty="0" err="1"/>
+              <a:t>untill</a:t>
+            </a:r>
+            <a:r>
+              <a:rPr lang="tr-TR" noProof="0" dirty="0"/>
+              <a:t> </a:t>
+            </a:r>
+            <a:r>
+              <a:rPr lang="tr-TR" noProof="0" dirty="0" err="1"/>
+              <a:t>optimal,target</a:t>
+            </a:r>
+            <a:r>
+              <a:rPr lang="tr-TR" noProof="0" dirty="0"/>
+              <a:t>, </a:t>
+            </a:r>
+            <a:r>
+              <a:rPr lang="tr-TR" noProof="0" dirty="0" err="1"/>
+              <a:t>point</a:t>
+            </a:r>
+            <a:r>
+              <a:rPr lang="tr-TR" noProof="0" dirty="0"/>
+              <a:t> is </a:t>
+            </a:r>
+            <a:r>
+              <a:rPr lang="tr-TR" noProof="0" dirty="0" err="1"/>
+              <a:t>found</a:t>
+            </a:r>
+            <a:r>
+              <a:rPr lang="tr-TR" noProof="0" dirty="0"/>
+              <a:t>.</a:t>
+            </a:r>
             <a:endParaRPr lang="en-US" noProof="0" dirty="0"/>
           </a:p>
         </p:txBody>

</xml_diff>